<commit_message>
Presentation with dark background added. Added GitHub link to presentation.
</commit_message>
<xml_diff>
--- a/Documentation/TeamZealot.pptx
+++ b/Documentation/TeamZealot.pptx
@@ -11,7 +11,7 @@
     <p:sldId id="262" r:id="rId5"/>
     <p:sldId id="263" r:id="rId6"/>
     <p:sldId id="261" r:id="rId7"/>
-    <p:sldId id="264" r:id="rId8"/>
+    <p:sldId id="265" r:id="rId8"/>
   </p:sldIdLst>
   <p:sldSz cx="9144000" cy="6858000" type="screen4x3"/>
   <p:notesSz cx="6858000" cy="9144000"/>
@@ -302,7 +302,7 @@
           <a:p>
             <a:fld id="{0CC40464-4E05-4957-8E54-79E8ABF28EE3}" type="datetimeFigureOut">
               <a:rPr lang="en-US" smtClean="0"/>
-              <a:t>02-Sep-14</a:t>
+              <a:t>03-Sep-14</a:t>
             </a:fld>
             <a:endParaRPr lang="en-US"/>
           </a:p>
@@ -479,7 +479,7 @@
           <a:p>
             <a:fld id="{0CC40464-4E05-4957-8E54-79E8ABF28EE3}" type="datetimeFigureOut">
               <a:rPr lang="en-US" smtClean="0"/>
-              <a:t>02-Sep-14</a:t>
+              <a:t>03-Sep-14</a:t>
             </a:fld>
             <a:endParaRPr lang="en-US"/>
           </a:p>
@@ -677,7 +677,7 @@
           <a:p>
             <a:fld id="{0CC40464-4E05-4957-8E54-79E8ABF28EE3}" type="datetimeFigureOut">
               <a:rPr lang="en-US" smtClean="0"/>
-              <a:t>02-Sep-14</a:t>
+              <a:t>03-Sep-14</a:t>
             </a:fld>
             <a:endParaRPr lang="en-US"/>
           </a:p>
@@ -831,7 +831,7 @@
           <a:p>
             <a:fld id="{0CC40464-4E05-4957-8E54-79E8ABF28EE3}" type="datetimeFigureOut">
               <a:rPr lang="en-US" smtClean="0"/>
-              <a:t>02-Sep-14</a:t>
+              <a:t>03-Sep-14</a:t>
             </a:fld>
             <a:endParaRPr lang="en-US"/>
           </a:p>
@@ -1106,7 +1106,7 @@
           <a:p>
             <a:fld id="{0CC40464-4E05-4957-8E54-79E8ABF28EE3}" type="datetimeFigureOut">
               <a:rPr lang="en-US" smtClean="0"/>
-              <a:t>02-Sep-14</a:t>
+              <a:t>03-Sep-14</a:t>
             </a:fld>
             <a:endParaRPr lang="en-US"/>
           </a:p>
@@ -1405,7 +1405,7 @@
           <a:p>
             <a:fld id="{0CC40464-4E05-4957-8E54-79E8ABF28EE3}" type="datetimeFigureOut">
               <a:rPr lang="en-US" smtClean="0"/>
-              <a:t>02-Sep-14</a:t>
+              <a:t>03-Sep-14</a:t>
             </a:fld>
             <a:endParaRPr lang="en-US"/>
           </a:p>
@@ -1847,7 +1847,7 @@
           <a:p>
             <a:fld id="{0CC40464-4E05-4957-8E54-79E8ABF28EE3}" type="datetimeFigureOut">
               <a:rPr lang="en-US" smtClean="0"/>
-              <a:t>02-Sep-14</a:t>
+              <a:t>03-Sep-14</a:t>
             </a:fld>
             <a:endParaRPr lang="en-US"/>
           </a:p>
@@ -1954,7 +1954,7 @@
           <a:p>
             <a:fld id="{0CC40464-4E05-4957-8E54-79E8ABF28EE3}" type="datetimeFigureOut">
               <a:rPr lang="en-US" smtClean="0"/>
-              <a:t>02-Sep-14</a:t>
+              <a:t>03-Sep-14</a:t>
             </a:fld>
             <a:endParaRPr lang="en-US"/>
           </a:p>
@@ -2074,7 +2074,7 @@
           <a:p>
             <a:fld id="{0CC40464-4E05-4957-8E54-79E8ABF28EE3}" type="datetimeFigureOut">
               <a:rPr lang="en-US" smtClean="0"/>
-              <a:t>02-Sep-14</a:t>
+              <a:t>03-Sep-14</a:t>
             </a:fld>
             <a:endParaRPr lang="en-US"/>
           </a:p>
@@ -2359,7 +2359,7 @@
           <a:p>
             <a:fld id="{0CC40464-4E05-4957-8E54-79E8ABF28EE3}" type="datetimeFigureOut">
               <a:rPr lang="en-US" smtClean="0"/>
-              <a:t>02-Sep-14</a:t>
+              <a:t>03-Sep-14</a:t>
             </a:fld>
             <a:endParaRPr lang="en-US"/>
           </a:p>
@@ -2630,7 +2630,7 @@
           <a:p>
             <a:fld id="{0CC40464-4E05-4957-8E54-79E8ABF28EE3}" type="datetimeFigureOut">
               <a:rPr lang="en-US" smtClean="0"/>
-              <a:t>02-Sep-14</a:t>
+              <a:t>03-Sep-14</a:t>
             </a:fld>
             <a:endParaRPr lang="en-US"/>
           </a:p>
@@ -2871,7 +2871,7 @@
           <a:p>
             <a:fld id="{0CC40464-4E05-4957-8E54-79E8ABF28EE3}" type="datetimeFigureOut">
               <a:rPr lang="en-US" smtClean="0"/>
-              <a:t>02-Sep-14</a:t>
+              <a:t>03-Sep-14</a:t>
             </a:fld>
             <a:endParaRPr lang="en-US"/>
           </a:p>
@@ -3461,11 +3461,11 @@
   <p:clrMapOvr>
     <a:masterClrMapping/>
   </p:clrMapOvr>
-  <mc:AlternateContent xmlns:mc="http://schemas.openxmlformats.org/markup-compatibility/2006">
-    <mc:Choice xmlns:p14="http://schemas.microsoft.com/office/powerpoint/2010/main" Requires="p14">
+  <mc:AlternateContent xmlns:mc="http://schemas.openxmlformats.org/markup-compatibility/2006" xmlns:p14="http://schemas.microsoft.com/office/powerpoint/2010/main">
+    <mc:Choice Requires="p14">
       <p:transition p14:dur="0"/>
     </mc:Choice>
-    <mc:Fallback>
+    <mc:Fallback xmlns="">
       <p:transition/>
     </mc:Fallback>
   </mc:AlternateContent>
@@ -4007,11 +4007,11 @@
   <p:clrMapOvr>
     <a:masterClrMapping/>
   </p:clrMapOvr>
-  <mc:AlternateContent xmlns:mc="http://schemas.openxmlformats.org/markup-compatibility/2006">
-    <mc:Choice xmlns:p14="http://schemas.microsoft.com/office/powerpoint/2010/main" Requires="p14">
+  <mc:AlternateContent xmlns:mc="http://schemas.openxmlformats.org/markup-compatibility/2006" xmlns:p14="http://schemas.microsoft.com/office/powerpoint/2010/main">
+    <mc:Choice Requires="p14">
       <p:transition p14:dur="0"/>
     </mc:Choice>
-    <mc:Fallback>
+    <mc:Fallback xmlns="">
       <p:transition/>
     </mc:Fallback>
   </mc:AlternateContent>
@@ -4084,11 +4084,11 @@
   <p:clrMapOvr>
     <a:masterClrMapping/>
   </p:clrMapOvr>
-  <mc:AlternateContent xmlns:mc="http://schemas.openxmlformats.org/markup-compatibility/2006">
-    <mc:Choice xmlns:p14="http://schemas.microsoft.com/office/powerpoint/2010/main" Requires="p14">
+  <mc:AlternateContent xmlns:mc="http://schemas.openxmlformats.org/markup-compatibility/2006" xmlns:p14="http://schemas.microsoft.com/office/powerpoint/2010/main">
+    <mc:Choice Requires="p14">
       <p:transition p14:dur="0"/>
     </mc:Choice>
-    <mc:Fallback>
+    <mc:Fallback xmlns="">
       <p:transition/>
     </mc:Fallback>
   </mc:AlternateContent>
@@ -4326,11 +4326,11 @@
   <p:clrMapOvr>
     <a:masterClrMapping/>
   </p:clrMapOvr>
-  <mc:AlternateContent xmlns:mc="http://schemas.openxmlformats.org/markup-compatibility/2006">
-    <mc:Choice xmlns:p14="http://schemas.microsoft.com/office/powerpoint/2010/main" Requires="p14">
+  <mc:AlternateContent xmlns:mc="http://schemas.openxmlformats.org/markup-compatibility/2006" xmlns:p14="http://schemas.microsoft.com/office/powerpoint/2010/main">
+    <mc:Choice Requires="p14">
       <p:transition p14:dur="0"/>
     </mc:Choice>
-    <mc:Fallback>
+    <mc:Fallback xmlns="">
       <p:transition/>
     </mc:Fallback>
   </mc:AlternateContent>
@@ -4629,11 +4629,11 @@
   <p:clrMapOvr>
     <a:masterClrMapping/>
   </p:clrMapOvr>
-  <mc:AlternateContent xmlns:mc="http://schemas.openxmlformats.org/markup-compatibility/2006">
-    <mc:Choice xmlns:p14="http://schemas.microsoft.com/office/powerpoint/2010/main" Requires="p14">
+  <mc:AlternateContent xmlns:mc="http://schemas.openxmlformats.org/markup-compatibility/2006" xmlns:p14="http://schemas.microsoft.com/office/powerpoint/2010/main">
+    <mc:Choice Requires="p14">
       <p:transition p14:dur="0"/>
     </mc:Choice>
-    <mc:Fallback>
+    <mc:Fallback xmlns="">
       <p:transition/>
     </mc:Fallback>
   </mc:AlternateContent>
@@ -4664,10 +4664,147 @@
           <a:chExt cx="0" cy="0"/>
         </a:xfrm>
       </p:grpSpPr>
+      <p:graphicFrame>
+        <p:nvGraphicFramePr>
+          <p:cNvPr id="2" name="Обект 1"/>
+          <p:cNvGraphicFramePr>
+            <a:graphicFrameLocks noChangeAspect="1"/>
+          </p:cNvGraphicFramePr>
+          <p:nvPr>
+            <p:extLst>
+              <p:ext uri="{D42A27DB-BD31-4B8C-83A1-F6EECF244321}">
+                <p14:modId xmlns:p14="http://schemas.microsoft.com/office/powerpoint/2010/main" val="2820920576"/>
+              </p:ext>
+            </p:extLst>
+          </p:nvPr>
+        </p:nvGraphicFramePr>
+        <p:xfrm>
+          <a:off x="2362200" y="3048000"/>
+          <a:ext cx="4570413" cy="3427413"/>
+        </p:xfrm>
+        <a:graphic>
+          <a:graphicData uri="http://schemas.openxmlformats.org/presentationml/2006/ole">
+            <mc:AlternateContent xmlns:mc="http://schemas.openxmlformats.org/markup-compatibility/2006">
+              <mc:Choice xmlns:v="urn:schemas-microsoft-com:vml" Requires="v">
+                <p:oleObj spid="_x0000_s1026" name="Презентация" r:id="rId3" imgW="4570501" imgH="3427618" progId="PowerPoint.Show.12">
+                  <p:embed/>
+                </p:oleObj>
+              </mc:Choice>
+              <mc:Fallback>
+                <p:oleObj name="Презентация" r:id="rId3" imgW="4570501" imgH="3427618" progId="PowerPoint.Show.12">
+                  <p:embed/>
+                  <p:pic>
+                    <p:nvPicPr>
+                      <p:cNvPr id="0" name=""/>
+                      <p:cNvPicPr/>
+                      <p:nvPr/>
+                    </p:nvPicPr>
+                    <p:blipFill>
+                      <a:blip r:embed="rId4"/>
+                      <a:stretch>
+                        <a:fillRect/>
+                      </a:stretch>
+                    </p:blipFill>
+                    <p:spPr>
+                      <a:xfrm>
+                        <a:off x="2362200" y="3048000"/>
+                        <a:ext cx="4570413" cy="3427413"/>
+                      </a:xfrm>
+                      <a:prstGeom prst="rect">
+                        <a:avLst/>
+                      </a:prstGeom>
+                    </p:spPr>
+                  </p:pic>
+                </p:oleObj>
+              </mc:Fallback>
+            </mc:AlternateContent>
+          </a:graphicData>
+        </a:graphic>
+      </p:graphicFrame>
+      <p:sp>
+        <p:nvSpPr>
+          <p:cNvPr id="6" name="Текстово поле 5"/>
+          <p:cNvSpPr txBox="1"/>
+          <p:nvPr/>
+        </p:nvSpPr>
+        <p:spPr>
+          <a:xfrm>
+            <a:off x="609600" y="457200"/>
+            <a:ext cx="8077200" cy="769441"/>
+          </a:xfrm>
+          <a:prstGeom prst="rect">
+            <a:avLst/>
+          </a:prstGeom>
+          <a:noFill/>
+        </p:spPr>
+        <p:txBody>
+          <a:bodyPr wrap="square" rtlCol="0">
+            <a:spAutoFit/>
+          </a:bodyPr>
+          <a:lstStyle/>
+          <a:p>
+            <a:pPr algn="ctr"/>
+            <a:r>
+              <a:rPr lang="en-US" sz="4400" b="1" dirty="0" smtClean="0">
+                <a:solidFill>
+                  <a:srgbClr val="000000"/>
+                </a:solidFill>
+                <a:latin typeface="Georgia" panose="02040502050405020303" pitchFamily="18" charset="0"/>
+              </a:rPr>
+              <a:t>GitHub:</a:t>
+            </a:r>
+            <a:endParaRPr lang="en-US" sz="4400" b="1" dirty="0">
+              <a:solidFill>
+                <a:srgbClr val="000000"/>
+              </a:solidFill>
+              <a:latin typeface="Georgia" panose="02040502050405020303" pitchFamily="18" charset="0"/>
+            </a:endParaRPr>
+          </a:p>
+        </p:txBody>
+      </p:sp>
+      <p:sp>
+        <p:nvSpPr>
+          <p:cNvPr id="7" name="Текстово поле 6"/>
+          <p:cNvSpPr txBox="1"/>
+          <p:nvPr/>
+        </p:nvSpPr>
+        <p:spPr>
+          <a:xfrm>
+            <a:off x="252483" y="1828800"/>
+            <a:ext cx="8686800" cy="646331"/>
+          </a:xfrm>
+          <a:prstGeom prst="rect">
+            <a:avLst/>
+          </a:prstGeom>
+          <a:noFill/>
+        </p:spPr>
+        <p:txBody>
+          <a:bodyPr wrap="square" rtlCol="0">
+            <a:spAutoFit/>
+          </a:bodyPr>
+          <a:lstStyle/>
+          <a:p>
+            <a:pPr algn="ctr"/>
+            <a:r>
+              <a:rPr lang="en-US" sz="3600" dirty="0" smtClean="0">
+                <a:solidFill>
+                  <a:srgbClr val="000000"/>
+                </a:solidFill>
+              </a:rPr>
+              <a:t>https://github.com/Team-Zealot-Databases</a:t>
+            </a:r>
+            <a:endParaRPr lang="en-US" sz="3600" dirty="0">
+              <a:solidFill>
+                <a:srgbClr val="000000"/>
+              </a:solidFill>
+            </a:endParaRPr>
+          </a:p>
+        </p:txBody>
+      </p:sp>
     </p:spTree>
     <p:extLst>
       <p:ext uri="{BB962C8B-B14F-4D97-AF65-F5344CB8AC3E}">
-        <p14:creationId xmlns:p14="http://schemas.microsoft.com/office/powerpoint/2010/main" val="1723196447"/>
+        <p14:creationId xmlns:p14="http://schemas.microsoft.com/office/powerpoint/2010/main" val="2648018161"/>
       </p:ext>
     </p:extLst>
   </p:cSld>

</xml_diff>

<commit_message>
Upload last version of the project. Project done!
</commit_message>
<xml_diff>
--- a/Documentation/TeamZealot.pptx
+++ b/Documentation/TeamZealot.pptx
@@ -10,8 +10,9 @@
     <p:sldId id="260" r:id="rId4"/>
     <p:sldId id="262" r:id="rId5"/>
     <p:sldId id="263" r:id="rId6"/>
-    <p:sldId id="261" r:id="rId7"/>
-    <p:sldId id="265" r:id="rId8"/>
+    <p:sldId id="266" r:id="rId7"/>
+    <p:sldId id="261" r:id="rId8"/>
+    <p:sldId id="265" r:id="rId9"/>
   </p:sldIdLst>
   <p:sldSz cx="9144000" cy="6858000" type="screen4x3"/>
   <p:notesSz cx="6858000" cy="9144000"/>
@@ -110,6 +111,22 @@
       </a:defRPr>
     </a:lvl9pPr>
   </p:defaultTextStyle>
+  <p:extLst>
+    <p:ext uri="{EFAFB233-063F-42B5-8137-9DF3F51BA10A}">
+      <p15:sldGuideLst xmlns:p15="http://schemas.microsoft.com/office/powerpoint/2012/main">
+        <p15:guide id="1" orient="horz" pos="2160">
+          <p15:clr>
+            <a:srgbClr val="A4A3A4"/>
+          </p15:clr>
+        </p15:guide>
+        <p15:guide id="2" pos="2880">
+          <p15:clr>
+            <a:srgbClr val="A4A3A4"/>
+          </p15:clr>
+        </p15:guide>
+      </p15:sldGuideLst>
+    </p:ext>
+  </p:extLst>
 </p:presentation>
 </file>
 
@@ -302,7 +319,7 @@
           <a:p>
             <a:fld id="{0CC40464-4E05-4957-8E54-79E8ABF28EE3}" type="datetimeFigureOut">
               <a:rPr lang="en-US" smtClean="0"/>
-              <a:t>03-Sep-14</a:t>
+              <a:t>9/4/2014</a:t>
             </a:fld>
             <a:endParaRPr lang="en-US"/>
           </a:p>
@@ -479,7 +496,7 @@
           <a:p>
             <a:fld id="{0CC40464-4E05-4957-8E54-79E8ABF28EE3}" type="datetimeFigureOut">
               <a:rPr lang="en-US" smtClean="0"/>
-              <a:t>03-Sep-14</a:t>
+              <a:t>9/4/2014</a:t>
             </a:fld>
             <a:endParaRPr lang="en-US"/>
           </a:p>
@@ -677,7 +694,7 @@
           <a:p>
             <a:fld id="{0CC40464-4E05-4957-8E54-79E8ABF28EE3}" type="datetimeFigureOut">
               <a:rPr lang="en-US" smtClean="0"/>
-              <a:t>03-Sep-14</a:t>
+              <a:t>9/4/2014</a:t>
             </a:fld>
             <a:endParaRPr lang="en-US"/>
           </a:p>
@@ -831,7 +848,7 @@
           <a:p>
             <a:fld id="{0CC40464-4E05-4957-8E54-79E8ABF28EE3}" type="datetimeFigureOut">
               <a:rPr lang="en-US" smtClean="0"/>
-              <a:t>03-Sep-14</a:t>
+              <a:t>9/4/2014</a:t>
             </a:fld>
             <a:endParaRPr lang="en-US"/>
           </a:p>
@@ -1106,7 +1123,7 @@
           <a:p>
             <a:fld id="{0CC40464-4E05-4957-8E54-79E8ABF28EE3}" type="datetimeFigureOut">
               <a:rPr lang="en-US" smtClean="0"/>
-              <a:t>03-Sep-14</a:t>
+              <a:t>9/4/2014</a:t>
             </a:fld>
             <a:endParaRPr lang="en-US"/>
           </a:p>
@@ -1405,7 +1422,7 @@
           <a:p>
             <a:fld id="{0CC40464-4E05-4957-8E54-79E8ABF28EE3}" type="datetimeFigureOut">
               <a:rPr lang="en-US" smtClean="0"/>
-              <a:t>03-Sep-14</a:t>
+              <a:t>9/4/2014</a:t>
             </a:fld>
             <a:endParaRPr lang="en-US"/>
           </a:p>
@@ -1847,7 +1864,7 @@
           <a:p>
             <a:fld id="{0CC40464-4E05-4957-8E54-79E8ABF28EE3}" type="datetimeFigureOut">
               <a:rPr lang="en-US" smtClean="0"/>
-              <a:t>03-Sep-14</a:t>
+              <a:t>9/4/2014</a:t>
             </a:fld>
             <a:endParaRPr lang="en-US"/>
           </a:p>
@@ -1954,7 +1971,7 @@
           <a:p>
             <a:fld id="{0CC40464-4E05-4957-8E54-79E8ABF28EE3}" type="datetimeFigureOut">
               <a:rPr lang="en-US" smtClean="0"/>
-              <a:t>03-Sep-14</a:t>
+              <a:t>9/4/2014</a:t>
             </a:fld>
             <a:endParaRPr lang="en-US"/>
           </a:p>
@@ -2074,7 +2091,7 @@
           <a:p>
             <a:fld id="{0CC40464-4E05-4957-8E54-79E8ABF28EE3}" type="datetimeFigureOut">
               <a:rPr lang="en-US" smtClean="0"/>
-              <a:t>03-Sep-14</a:t>
+              <a:t>9/4/2014</a:t>
             </a:fld>
             <a:endParaRPr lang="en-US"/>
           </a:p>
@@ -2359,7 +2376,7 @@
           <a:p>
             <a:fld id="{0CC40464-4E05-4957-8E54-79E8ABF28EE3}" type="datetimeFigureOut">
               <a:rPr lang="en-US" smtClean="0"/>
-              <a:t>03-Sep-14</a:t>
+              <a:t>9/4/2014</a:t>
             </a:fld>
             <a:endParaRPr lang="en-US"/>
           </a:p>
@@ -2630,7 +2647,7 @@
           <a:p>
             <a:fld id="{0CC40464-4E05-4957-8E54-79E8ABF28EE3}" type="datetimeFigureOut">
               <a:rPr lang="en-US" smtClean="0"/>
-              <a:t>03-Sep-14</a:t>
+              <a:t>9/4/2014</a:t>
             </a:fld>
             <a:endParaRPr lang="en-US"/>
           </a:p>
@@ -2871,7 +2888,7 @@
           <a:p>
             <a:fld id="{0CC40464-4E05-4957-8E54-79E8ABF28EE3}" type="datetimeFigureOut">
               <a:rPr lang="en-US" smtClean="0"/>
-              <a:t>03-Sep-14</a:t>
+              <a:t>9/4/2014</a:t>
             </a:fld>
             <a:endParaRPr lang="en-US"/>
           </a:p>
@@ -4487,6 +4504,211 @@
           <a:chExt cx="0" cy="0"/>
         </a:xfrm>
       </p:grpSpPr>
+      <p:sp>
+        <p:nvSpPr>
+          <p:cNvPr id="2" name="Content Placeholder 1"/>
+          <p:cNvSpPr>
+            <a:spLocks noGrp="1"/>
+          </p:cNvSpPr>
+          <p:nvPr>
+            <p:ph sz="quarter" idx="13"/>
+          </p:nvPr>
+        </p:nvSpPr>
+        <p:spPr>
+          <a:xfrm>
+            <a:off x="468086" y="1524000"/>
+            <a:ext cx="8172994" cy="3581400"/>
+          </a:xfrm>
+        </p:spPr>
+        <p:txBody>
+          <a:bodyPr>
+            <a:normAutofit/>
+          </a:bodyPr>
+          <a:lstStyle/>
+          <a:p>
+            <a:r>
+              <a:rPr lang="en-US" sz="3200" dirty="0" smtClean="0"/>
+              <a:t>Repository pattern</a:t>
+            </a:r>
+          </a:p>
+          <a:p>
+            <a:r>
+              <a:rPr lang="en-US" sz="3200" dirty="0" err="1" smtClean="0"/>
+              <a:t>Uow</a:t>
+            </a:r>
+            <a:r>
+              <a:rPr lang="en-US" sz="3200" dirty="0" smtClean="0"/>
+              <a:t> - </a:t>
+            </a:r>
+            <a:r>
+              <a:rPr lang="en-US" sz="3200" dirty="0" err="1" smtClean="0"/>
+              <a:t>RobotsFactoryData</a:t>
+            </a:r>
+            <a:endParaRPr lang="en-CA" sz="3200" dirty="0"/>
+          </a:p>
+        </p:txBody>
+      </p:sp>
+      <p:sp>
+        <p:nvSpPr>
+          <p:cNvPr id="4" name="Заглавие 6"/>
+          <p:cNvSpPr txBox="1">
+            <a:spLocks/>
+          </p:cNvSpPr>
+          <p:nvPr/>
+        </p:nvSpPr>
+        <p:spPr>
+          <a:xfrm>
+            <a:off x="457200" y="228600"/>
+            <a:ext cx="8183880" cy="762000"/>
+          </a:xfrm>
+          <a:prstGeom prst="rect">
+            <a:avLst/>
+          </a:prstGeom>
+        </p:spPr>
+        <p:txBody>
+          <a:bodyPr vert="horz" lIns="91440" tIns="45720" rIns="91440" bIns="45720" rtlCol="0" anchor="t">
+            <a:normAutofit/>
+          </a:bodyPr>
+          <a:lstStyle>
+            <a:lvl1pPr algn="l" defTabSz="914400" rtl="0" eaLnBrk="1" latinLnBrk="0" hangingPunct="1">
+              <a:spcBef>
+                <a:spcPct val="0"/>
+              </a:spcBef>
+              <a:buNone/>
+              <a:defRPr sz="1800" kern="1200" cap="all" baseline="0">
+                <a:solidFill>
+                  <a:schemeClr val="tx1"/>
+                </a:solidFill>
+                <a:latin typeface="+mj-lt"/>
+                <a:ea typeface="+mj-ea"/>
+                <a:cs typeface="+mj-cs"/>
+              </a:defRPr>
+            </a:lvl1pPr>
+            <a:lvl2pPr eaLnBrk="1" hangingPunct="1">
+              <a:defRPr>
+                <a:solidFill>
+                  <a:schemeClr val="tx2"/>
+                </a:solidFill>
+              </a:defRPr>
+            </a:lvl2pPr>
+            <a:lvl3pPr eaLnBrk="1" hangingPunct="1">
+              <a:defRPr>
+                <a:solidFill>
+                  <a:schemeClr val="tx2"/>
+                </a:solidFill>
+              </a:defRPr>
+            </a:lvl3pPr>
+            <a:lvl4pPr eaLnBrk="1" hangingPunct="1">
+              <a:defRPr>
+                <a:solidFill>
+                  <a:schemeClr val="tx2"/>
+                </a:solidFill>
+              </a:defRPr>
+            </a:lvl4pPr>
+            <a:lvl5pPr eaLnBrk="1" hangingPunct="1">
+              <a:defRPr>
+                <a:solidFill>
+                  <a:schemeClr val="tx2"/>
+                </a:solidFill>
+              </a:defRPr>
+            </a:lvl5pPr>
+            <a:lvl6pPr eaLnBrk="1" hangingPunct="1">
+              <a:defRPr>
+                <a:solidFill>
+                  <a:schemeClr val="tx2"/>
+                </a:solidFill>
+              </a:defRPr>
+            </a:lvl6pPr>
+            <a:lvl7pPr eaLnBrk="1" hangingPunct="1">
+              <a:defRPr>
+                <a:solidFill>
+                  <a:schemeClr val="tx2"/>
+                </a:solidFill>
+              </a:defRPr>
+            </a:lvl7pPr>
+            <a:lvl8pPr eaLnBrk="1" hangingPunct="1">
+              <a:defRPr>
+                <a:solidFill>
+                  <a:schemeClr val="tx2"/>
+                </a:solidFill>
+              </a:defRPr>
+            </a:lvl8pPr>
+            <a:lvl9pPr eaLnBrk="1" hangingPunct="1">
+              <a:defRPr>
+                <a:solidFill>
+                  <a:schemeClr val="tx2"/>
+                </a:solidFill>
+              </a:defRPr>
+            </a:lvl9pPr>
+          </a:lstStyle>
+          <a:p>
+            <a:pPr algn="ctr"/>
+            <a:r>
+              <a:rPr lang="en-US" sz="4400" dirty="0" smtClean="0">
+                <a:solidFill>
+                  <a:schemeClr val="bg1">
+                    <a:lumMod val="50000"/>
+                  </a:schemeClr>
+                </a:solidFill>
+                <a:effectLst>
+                  <a:outerShdw blurRad="38100" dist="38100" dir="2700000" algn="tl">
+                    <a:srgbClr val="000000">
+                      <a:alpha val="43137"/>
+                    </a:srgbClr>
+                  </a:outerShdw>
+                </a:effectLst>
+                <a:latin typeface="Georgia" panose="02040502050405020303" pitchFamily="18" charset="0"/>
+              </a:rPr>
+              <a:t>Common Design patterns</a:t>
+            </a:r>
+            <a:endParaRPr lang="en-US" sz="4400" dirty="0">
+              <a:solidFill>
+                <a:schemeClr val="bg1">
+                  <a:lumMod val="50000"/>
+                </a:schemeClr>
+              </a:solidFill>
+              <a:effectLst>
+                <a:outerShdw blurRad="38100" dist="38100" dir="2700000" algn="tl">
+                  <a:srgbClr val="000000">
+                    <a:alpha val="43137"/>
+                  </a:srgbClr>
+                </a:outerShdw>
+              </a:effectLst>
+              <a:latin typeface="Georgia" panose="02040502050405020303" pitchFamily="18" charset="0"/>
+            </a:endParaRPr>
+          </a:p>
+        </p:txBody>
+      </p:sp>
+    </p:spTree>
+    <p:extLst>
+      <p:ext uri="{BB962C8B-B14F-4D97-AF65-F5344CB8AC3E}">
+        <p14:creationId xmlns:p14="http://schemas.microsoft.com/office/powerpoint/2010/main" val="2435215187"/>
+      </p:ext>
+    </p:extLst>
+  </p:cSld>
+  <p:clrMapOvr>
+    <a:masterClrMapping/>
+  </p:clrMapOvr>
+</p:sld>
+</file>
+
+<file path=ppt/slides/slide7.xml><?xml version="1.0" encoding="utf-8"?>
+<p:sld xmlns:a="http://schemas.openxmlformats.org/drawingml/2006/main" xmlns:r="http://schemas.openxmlformats.org/officeDocument/2006/relationships" xmlns:p="http://schemas.openxmlformats.org/presentationml/2006/main">
+  <p:cSld>
+    <p:spTree>
+      <p:nvGrpSpPr>
+        <p:cNvPr id="1" name=""/>
+        <p:cNvGrpSpPr/>
+        <p:nvPr/>
+      </p:nvGrpSpPr>
+      <p:grpSpPr>
+        <a:xfrm>
+          <a:off x="0" y="0"/>
+          <a:ext cx="0" cy="0"/>
+          <a:chOff x="0" y="0"/>
+          <a:chExt cx="0" cy="0"/>
+        </a:xfrm>
+      </p:grpSpPr>
       <p:pic>
         <p:nvPicPr>
           <p:cNvPr id="1026" name="Picture 2"/>
@@ -4647,7 +4869,7 @@
 </p:sld>
 </file>
 
-<file path=ppt/slides/slide7.xml><?xml version="1.0" encoding="utf-8"?>
+<file path=ppt/slides/slide8.xml><?xml version="1.0" encoding="utf-8"?>
 <p:sld xmlns:a="http://schemas.openxmlformats.org/drawingml/2006/main" xmlns:r="http://schemas.openxmlformats.org/officeDocument/2006/relationships" xmlns:p="http://schemas.openxmlformats.org/presentationml/2006/main">
   <p:cSld>
     <p:spTree>
@@ -4686,7 +4908,7 @@
           <a:graphicData uri="http://schemas.openxmlformats.org/presentationml/2006/ole">
             <mc:AlternateContent xmlns:mc="http://schemas.openxmlformats.org/markup-compatibility/2006">
               <mc:Choice xmlns:v="urn:schemas-microsoft-com:vml" Requires="v">
-                <p:oleObj spid="_x0000_s1027" name="Презентация" r:id="rId5" imgW="4570501" imgH="3427618" progId="PowerPoint.Show.12">
+                <p:oleObj spid="_x0000_s1028" name="Презентация" r:id="rId5" imgW="4570501" imgH="3427618" progId="PowerPoint.Show.12">
                   <p:embed/>
                 </p:oleObj>
               </mc:Choice>

</xml_diff>